<commit_message>
Added Substances Summary table to the screening reporter .
</commit_message>
<xml_diff>
--- a/resources/pptx_templates/Screening_report_template.pptx
+++ b/resources/pptx_templates/Screening_report_template.pptx
@@ -220,7 +220,7 @@
           <a:p>
             <a:fld id="{F9EE9108-8403-9346-994C-754CE975162E}" type="datetimeFigureOut">
               <a:rPr lang="en-GB" smtClean="0"/>
-              <a:t>15/01/2025</a:t>
+              <a:t>17/01/2025</a:t>
             </a:fld>
             <a:endParaRPr lang="en-GB"/>
           </a:p>
@@ -376,7 +376,7 @@
           <a:p>
             <a:fld id="{11AF75C9-0359-FC42-A307-982A28152EDC}" type="datetimeFigureOut">
               <a:rPr lang="en-US" smtClean="0"/>
-              <a:t>1/15/25</a:t>
+              <a:t>1/17/25</a:t>
             </a:fld>
             <a:r>
               <a:rPr lang="en-US" dirty="0"/>
@@ -915,6 +915,308 @@
 
 <file path=ppt/slideLayouts/slideLayout2.xml><?xml version="1.0" encoding="utf-8"?>
 <p:sldLayout xmlns:a="http://schemas.openxmlformats.org/drawingml/2006/main" xmlns:r="http://schemas.openxmlformats.org/officeDocument/2006/relationships" xmlns:p="http://schemas.openxmlformats.org/presentationml/2006/main" preserve="1" userDrawn="1">
+  <p:cSld name="Substances Summary">
+    <p:spTree>
+      <p:nvGrpSpPr>
+        <p:cNvPr id="1" name=""/>
+        <p:cNvGrpSpPr/>
+        <p:nvPr/>
+      </p:nvGrpSpPr>
+      <p:grpSpPr>
+        <a:xfrm>
+          <a:off x="0" y="0"/>
+          <a:ext cx="0" cy="0"/>
+          <a:chOff x="0" y="0"/>
+          <a:chExt cx="0" cy="0"/>
+        </a:xfrm>
+      </p:grpSpPr>
+      <p:sp>
+        <p:nvSpPr>
+          <p:cNvPr id="20" name="Date">
+            <a:extLst>
+              <a:ext uri="{FF2B5EF4-FFF2-40B4-BE49-F238E27FC236}">
+                <a16:creationId xmlns:a16="http://schemas.microsoft.com/office/drawing/2014/main" id="{2B1A01B5-1FBB-EFD7-B8EE-CAA6F27AB169}"/>
+              </a:ext>
+            </a:extLst>
+          </p:cNvPr>
+          <p:cNvSpPr>
+            <a:spLocks noGrp="1"/>
+          </p:cNvSpPr>
+          <p:nvPr>
+            <p:ph type="dt" sz="half" idx="10"/>
+          </p:nvPr>
+        </p:nvSpPr>
+        <p:spPr>
+          <a:xfrm>
+            <a:off x="233816" y="6356350"/>
+            <a:ext cx="2743200" cy="365125"/>
+          </a:xfrm>
+        </p:spPr>
+        <p:txBody>
+          <a:bodyPr/>
+          <a:lstStyle/>
+          <a:p>
+            <a:fld id="{11AF75C9-0359-FC42-A307-982A28152EDC}" type="datetimeFigureOut">
+              <a:rPr lang="en-US" smtClean="0"/>
+              <a:t>1/17/25</a:t>
+            </a:fld>
+            <a:r>
+              <a:rPr lang="en-US" dirty="0"/>
+              <a:t> Date</a:t>
+            </a:r>
+          </a:p>
+        </p:txBody>
+      </p:sp>
+      <p:sp>
+        <p:nvSpPr>
+          <p:cNvPr id="21" name="Footer">
+            <a:extLst>
+              <a:ext uri="{FF2B5EF4-FFF2-40B4-BE49-F238E27FC236}">
+                <a16:creationId xmlns:a16="http://schemas.microsoft.com/office/drawing/2014/main" id="{F524104A-595F-221E-3B7C-527EF0C8F4DF}"/>
+              </a:ext>
+            </a:extLst>
+          </p:cNvPr>
+          <p:cNvSpPr>
+            <a:spLocks noGrp="1"/>
+          </p:cNvSpPr>
+          <p:nvPr>
+            <p:ph type="ftr" sz="quarter" idx="11"/>
+          </p:nvPr>
+        </p:nvSpPr>
+        <p:spPr>
+          <a:xfrm>
+            <a:off x="4038600" y="6356350"/>
+            <a:ext cx="4114800" cy="365125"/>
+          </a:xfrm>
+        </p:spPr>
+        <p:txBody>
+          <a:bodyPr/>
+          <a:lstStyle/>
+          <a:p>
+            <a:r>
+              <a:rPr lang="en-US" dirty="0"/>
+              <a:t>Footer</a:t>
+            </a:r>
+          </a:p>
+        </p:txBody>
+      </p:sp>
+      <p:sp>
+        <p:nvSpPr>
+          <p:cNvPr id="22" name="Slide Number">
+            <a:extLst>
+              <a:ext uri="{FF2B5EF4-FFF2-40B4-BE49-F238E27FC236}">
+                <a16:creationId xmlns:a16="http://schemas.microsoft.com/office/drawing/2014/main" id="{2CF3C897-C475-5398-90A2-34467E2E8BC0}"/>
+              </a:ext>
+            </a:extLst>
+          </p:cNvPr>
+          <p:cNvSpPr>
+            <a:spLocks noGrp="1"/>
+          </p:cNvSpPr>
+          <p:nvPr>
+            <p:ph type="sldNum" sz="quarter" idx="12"/>
+          </p:nvPr>
+        </p:nvSpPr>
+        <p:spPr>
+          <a:xfrm>
+            <a:off x="8809036" y="6356349"/>
+            <a:ext cx="2743200" cy="365125"/>
+          </a:xfrm>
+        </p:spPr>
+        <p:txBody>
+          <a:bodyPr/>
+          <a:lstStyle/>
+          <a:p>
+            <a:r>
+              <a:rPr lang="en-US" dirty="0"/>
+              <a:t>Page number </a:t>
+            </a:r>
+            <a:fld id="{8363412E-7DC2-7642-80E9-9CADEAF62AFD}" type="slidenum">
+              <a:rPr lang="en-US" smtClean="0"/>
+              <a:t>‹#›</a:t>
+            </a:fld>
+            <a:endParaRPr lang="en-US" dirty="0"/>
+          </a:p>
+        </p:txBody>
+      </p:sp>
+      <p:sp>
+        <p:nvSpPr>
+          <p:cNvPr id="26" name="SummaryTable">
+            <a:extLst>
+              <a:ext uri="{FF2B5EF4-FFF2-40B4-BE49-F238E27FC236}">
+                <a16:creationId xmlns:a16="http://schemas.microsoft.com/office/drawing/2014/main" id="{1595622D-3DC8-CB11-7640-C218D17D9008}"/>
+              </a:ext>
+            </a:extLst>
+          </p:cNvPr>
+          <p:cNvSpPr>
+            <a:spLocks noGrp="1"/>
+          </p:cNvSpPr>
+          <p:nvPr>
+            <p:ph type="tbl" sz="quarter" idx="21" hasCustomPrompt="1"/>
+          </p:nvPr>
+        </p:nvSpPr>
+        <p:spPr>
+          <a:xfrm>
+            <a:off x="226973" y="985967"/>
+            <a:ext cx="11324808" cy="5370381"/>
+          </a:xfrm>
+        </p:spPr>
+        <p:txBody>
+          <a:bodyPr/>
+          <a:lstStyle>
+            <a:lvl1pPr marL="0" indent="0">
+              <a:buFontTx/>
+              <a:buNone/>
+              <a:defRPr sz="2400"/>
+            </a:lvl1pPr>
+          </a:lstStyle>
+          <a:p>
+            <a:pPr marL="0" marR="0" lvl="0" indent="0" algn="l" defTabSz="914400" rtl="0" eaLnBrk="1" fontAlgn="auto" latinLnBrk="0" hangingPunct="1">
+              <a:lnSpc>
+                <a:spcPct val="90000"/>
+              </a:lnSpc>
+              <a:spcBef>
+                <a:spcPts val="1000"/>
+              </a:spcBef>
+              <a:spcAft>
+                <a:spcPts val="0"/>
+              </a:spcAft>
+              <a:buClrTx/>
+              <a:buSzTx/>
+              <a:buFontTx/>
+              <a:buNone/>
+              <a:tabLst/>
+              <a:defRPr/>
+            </a:pPr>
+            <a:r>
+              <a:rPr lang="en-US" dirty="0"/>
+              <a:t>Table</a:t>
+            </a:r>
+          </a:p>
+        </p:txBody>
+      </p:sp>
+      <p:sp>
+        <p:nvSpPr>
+          <p:cNvPr id="4" name="Subtitle">
+            <a:extLst>
+              <a:ext uri="{FF2B5EF4-FFF2-40B4-BE49-F238E27FC236}">
+                <a16:creationId xmlns:a16="http://schemas.microsoft.com/office/drawing/2014/main" id="{570C5144-83F6-8E9B-17B1-DD06E41A4FF9}"/>
+              </a:ext>
+            </a:extLst>
+          </p:cNvPr>
+          <p:cNvSpPr>
+            <a:spLocks noGrp="1"/>
+          </p:cNvSpPr>
+          <p:nvPr>
+            <p:ph type="body" sz="quarter" idx="28" hasCustomPrompt="1"/>
+          </p:nvPr>
+        </p:nvSpPr>
+        <p:spPr>
+          <a:xfrm>
+            <a:off x="233137" y="559332"/>
+            <a:ext cx="11318420" cy="426636"/>
+          </a:xfrm>
+        </p:spPr>
+        <p:txBody>
+          <a:bodyPr anchor="ctr">
+            <a:normAutofit/>
+          </a:bodyPr>
+          <a:lstStyle>
+            <a:lvl1pPr marL="0" indent="0" algn="ctr">
+              <a:buNone/>
+              <a:defRPr sz="1400">
+                <a:solidFill>
+                  <a:srgbClr val="2E705C"/>
+                </a:solidFill>
+                <a:latin typeface="Helvetica" pitchFamily="2" charset="0"/>
+              </a:defRPr>
+            </a:lvl1pPr>
+          </a:lstStyle>
+          <a:p>
+            <a:pPr lvl="0"/>
+            <a:r>
+              <a:rPr lang="en-GB" dirty="0"/>
+              <a:t>Subtitle</a:t>
+            </a:r>
+          </a:p>
+        </p:txBody>
+      </p:sp>
+      <p:sp>
+        <p:nvSpPr>
+          <p:cNvPr id="2" name="Title">
+            <a:extLst>
+              <a:ext uri="{FF2B5EF4-FFF2-40B4-BE49-F238E27FC236}">
+                <a16:creationId xmlns:a16="http://schemas.microsoft.com/office/drawing/2014/main" id="{9279AAA2-4FB3-C05A-6F5E-EB3C445BDFDB}"/>
+              </a:ext>
+            </a:extLst>
+          </p:cNvPr>
+          <p:cNvSpPr>
+            <a:spLocks noGrp="1"/>
+          </p:cNvSpPr>
+          <p:nvPr>
+            <p:ph type="body" sz="quarter" idx="26" hasCustomPrompt="1"/>
+          </p:nvPr>
+        </p:nvSpPr>
+        <p:spPr>
+          <a:xfrm>
+            <a:off x="233361" y="66675"/>
+            <a:ext cx="11318420" cy="471247"/>
+          </a:xfrm>
+        </p:spPr>
+        <p:txBody>
+          <a:bodyPr anchor="ctr">
+            <a:noAutofit/>
+          </a:bodyPr>
+          <a:lstStyle>
+            <a:lvl1pPr marL="0" indent="0" algn="ctr">
+              <a:buNone/>
+              <a:defRPr sz="2400" b="1">
+                <a:solidFill>
+                  <a:srgbClr val="0B4E83"/>
+                </a:solidFill>
+                <a:latin typeface="Helvetica" pitchFamily="2" charset="0"/>
+              </a:defRPr>
+            </a:lvl1pPr>
+          </a:lstStyle>
+          <a:p>
+            <a:pPr lvl="0"/>
+            <a:r>
+              <a:rPr lang="en-GB" dirty="0"/>
+              <a:t>Title</a:t>
+            </a:r>
+          </a:p>
+        </p:txBody>
+      </p:sp>
+    </p:spTree>
+    <p:extLst>
+      <p:ext uri="{BB962C8B-B14F-4D97-AF65-F5344CB8AC3E}">
+        <p14:creationId xmlns:p14="http://schemas.microsoft.com/office/powerpoint/2010/main" val="1962730578"/>
+      </p:ext>
+    </p:extLst>
+  </p:cSld>
+  <p:clrMapOvr>
+    <a:masterClrMapping/>
+  </p:clrMapOvr>
+  <p:extLst>
+    <p:ext uri="{DCECCB84-F9BA-43D5-87BE-67443E8EF086}">
+      <p15:sldGuideLst xmlns:p15="http://schemas.microsoft.com/office/powerpoint/2012/main">
+        <p15:guide id="1" orient="horz" pos="2160">
+          <p15:clr>
+            <a:srgbClr val="FBAE40"/>
+          </p15:clr>
+        </p15:guide>
+        <p15:guide id="2" pos="3840">
+          <p15:clr>
+            <a:srgbClr val="FBAE40"/>
+          </p15:clr>
+        </p15:guide>
+      </p15:sldGuideLst>
+    </p:ext>
+  </p:extLst>
+</p:sldLayout>
+</file>
+
+<file path=ppt/slideLayouts/slideLayout3.xml><?xml version="1.0" encoding="utf-8"?>
+<p:sldLayout xmlns:a="http://schemas.openxmlformats.org/drawingml/2006/main" xmlns:r="http://schemas.openxmlformats.org/officeDocument/2006/relationships" xmlns:p="http://schemas.openxmlformats.org/presentationml/2006/main" preserve="1" userDrawn="1">
   <p:cSld name="Report Slide">
     <p:spTree>
       <p:nvGrpSpPr>
@@ -958,7 +1260,7 @@
           <a:p>
             <a:fld id="{11AF75C9-0359-FC42-A307-982A28152EDC}" type="datetimeFigureOut">
               <a:rPr lang="en-US" smtClean="0"/>
-              <a:t>1/15/25</a:t>
+              <a:t>1/17/25</a:t>
             </a:fld>
             <a:r>
               <a:rPr lang="en-US" dirty="0"/>
@@ -1536,7 +1838,7 @@
           <a:p>
             <a:fld id="{11AF75C9-0359-FC42-A307-982A28152EDC}" type="datetimeFigureOut">
               <a:rPr lang="en-US" smtClean="0"/>
-              <a:t>1/15/25</a:t>
+              <a:t>1/17/25</a:t>
             </a:fld>
             <a:endParaRPr lang="en-US"/>
           </a:p>
@@ -1642,7 +1944,8 @@
   <p:clrMap bg1="lt1" tx1="dk1" bg2="lt2" tx2="dk2" accent1="accent1" accent2="accent2" accent3="accent3" accent4="accent4" accent5="accent5" accent6="accent6" hlink="hlink" folHlink="folHlink"/>
   <p:sldLayoutIdLst>
     <p:sldLayoutId id="2147483672" r:id="rId1"/>
-    <p:sldLayoutId id="2147483673" r:id="rId2"/>
+    <p:sldLayoutId id="2147483674" r:id="rId2"/>
+    <p:sldLayoutId id="2147483673" r:id="rId3"/>
   </p:sldLayoutIdLst>
   <p:txStyles>
     <p:titleStyle>

</xml_diff>

<commit_message>
PPTx writer. Some minor renaming and bug fixing
</commit_message>
<xml_diff>
--- a/resources/pptx_templates/Screening_report_template.pptx
+++ b/resources/pptx_templates/Screening_report_template.pptx
@@ -220,7 +220,7 @@
           <a:p>
             <a:fld id="{F9EE9108-8403-9346-994C-754CE975162E}" type="datetimeFigureOut">
               <a:rPr lang="en-GB" smtClean="0"/>
-              <a:t>17/01/2025</a:t>
+              <a:t>20/01/2025</a:t>
             </a:fld>
             <a:endParaRPr lang="en-GB"/>
           </a:p>
@@ -376,7 +376,7 @@
           <a:p>
             <a:fld id="{11AF75C9-0359-FC42-A307-982A28152EDC}" type="datetimeFigureOut">
               <a:rPr lang="en-US" smtClean="0"/>
-              <a:t>1/17/25</a:t>
+              <a:t>1/20/25</a:t>
             </a:fld>
             <a:r>
               <a:rPr lang="en-US" dirty="0"/>
@@ -963,7 +963,7 @@
           <a:p>
             <a:fld id="{11AF75C9-0359-FC42-A307-982A28152EDC}" type="datetimeFigureOut">
               <a:rPr lang="en-US" smtClean="0"/>
-              <a:t>1/17/25</a:t>
+              <a:t>1/20/25</a:t>
             </a:fld>
             <a:r>
               <a:rPr lang="en-US" dirty="0"/>
@@ -1222,7 +1222,7 @@
 
 <file path=ppt/slideLayouts/slideLayout3.xml><?xml version="1.0" encoding="utf-8"?>
 <p:sldLayout xmlns:a="http://schemas.openxmlformats.org/drawingml/2006/main" xmlns:r="http://schemas.openxmlformats.org/officeDocument/2006/relationships" xmlns:p="http://schemas.openxmlformats.org/presentationml/2006/main" preserve="1" userDrawn="1">
-  <p:cSld name="Report Slide">
+  <p:cSld name="Substance Slide">
     <p:spTree>
       <p:nvGrpSpPr>
         <p:cNvPr id="1" name=""/>
@@ -1472,7 +1472,7 @@
           <a:p>
             <a:fld id="{11AF75C9-0359-FC42-A307-982A28152EDC}" type="datetimeFigureOut">
               <a:rPr lang="en-US" smtClean="0"/>
-              <a:t>1/17/25</a:t>
+              <a:t>1/20/25</a:t>
             </a:fld>
             <a:r>
               <a:rPr lang="en-US" dirty="0"/>
@@ -1843,7 +1843,7 @@
           <a:p>
             <a:fld id="{11AF75C9-0359-FC42-A307-982A28152EDC}" type="datetimeFigureOut">
               <a:rPr lang="en-US" smtClean="0"/>
-              <a:t>1/17/25</a:t>
+              <a:t>1/20/25</a:t>
             </a:fld>
             <a:endParaRPr lang="en-US"/>
           </a:p>

</xml_diff>

<commit_message>
PPTx writer. added  footer page number
</commit_message>
<xml_diff>
--- a/resources/pptx_templates/Screening_report_template.pptx
+++ b/resources/pptx_templates/Screening_report_template.pptx
@@ -350,114 +350,6 @@
       </p:grpSpPr>
       <p:sp>
         <p:nvSpPr>
-          <p:cNvPr id="4" name="Date">
-            <a:extLst>
-              <a:ext uri="{FF2B5EF4-FFF2-40B4-BE49-F238E27FC236}">
-                <a16:creationId xmlns:a16="http://schemas.microsoft.com/office/drawing/2014/main" id="{B7A0AC60-0EFE-2470-8E4F-776E500B9B6A}"/>
-              </a:ext>
-            </a:extLst>
-          </p:cNvPr>
-          <p:cNvSpPr>
-            <a:spLocks noGrp="1"/>
-          </p:cNvSpPr>
-          <p:nvPr>
-            <p:ph type="dt" sz="half" idx="10"/>
-          </p:nvPr>
-        </p:nvSpPr>
-        <p:spPr>
-          <a:xfrm>
-            <a:off x="433841" y="6356350"/>
-            <a:ext cx="2743200" cy="365125"/>
-          </a:xfrm>
-        </p:spPr>
-        <p:txBody>
-          <a:bodyPr/>
-          <a:lstStyle/>
-          <a:p>
-            <a:fld id="{11AF75C9-0359-FC42-A307-982A28152EDC}" type="datetimeFigureOut">
-              <a:rPr lang="en-US" smtClean="0"/>
-              <a:t>1/20/25</a:t>
-            </a:fld>
-            <a:r>
-              <a:rPr lang="en-US" dirty="0"/>
-              <a:t> Date</a:t>
-            </a:r>
-          </a:p>
-        </p:txBody>
-      </p:sp>
-      <p:sp>
-        <p:nvSpPr>
-          <p:cNvPr id="5" name="Footer">
-            <a:extLst>
-              <a:ext uri="{FF2B5EF4-FFF2-40B4-BE49-F238E27FC236}">
-                <a16:creationId xmlns:a16="http://schemas.microsoft.com/office/drawing/2014/main" id="{A6FA403C-43E1-1010-54D2-C71A1E7A175D}"/>
-              </a:ext>
-            </a:extLst>
-          </p:cNvPr>
-          <p:cNvSpPr>
-            <a:spLocks noGrp="1"/>
-          </p:cNvSpPr>
-          <p:nvPr>
-            <p:ph type="ftr" sz="quarter" idx="11"/>
-          </p:nvPr>
-        </p:nvSpPr>
-        <p:spPr>
-          <a:xfrm>
-            <a:off x="4038600" y="6356350"/>
-            <a:ext cx="4114800" cy="365125"/>
-          </a:xfrm>
-        </p:spPr>
-        <p:txBody>
-          <a:bodyPr/>
-          <a:lstStyle/>
-          <a:p>
-            <a:r>
-              <a:rPr lang="en-US" dirty="0"/>
-              <a:t>Footer</a:t>
-            </a:r>
-          </a:p>
-        </p:txBody>
-      </p:sp>
-      <p:sp>
-        <p:nvSpPr>
-          <p:cNvPr id="6" name="Slide Number">
-            <a:extLst>
-              <a:ext uri="{FF2B5EF4-FFF2-40B4-BE49-F238E27FC236}">
-                <a16:creationId xmlns:a16="http://schemas.microsoft.com/office/drawing/2014/main" id="{7F147853-1618-961D-F536-C0B7AA95C4DB}"/>
-              </a:ext>
-            </a:extLst>
-          </p:cNvPr>
-          <p:cNvSpPr>
-            <a:spLocks noGrp="1"/>
-          </p:cNvSpPr>
-          <p:nvPr>
-            <p:ph type="sldNum" sz="quarter" idx="12"/>
-          </p:nvPr>
-        </p:nvSpPr>
-        <p:spPr>
-          <a:xfrm>
-            <a:off x="9009061" y="6356349"/>
-            <a:ext cx="2743200" cy="365125"/>
-          </a:xfrm>
-        </p:spPr>
-        <p:txBody>
-          <a:bodyPr/>
-          <a:lstStyle/>
-          <a:p>
-            <a:r>
-              <a:rPr lang="en-US" dirty="0"/>
-              <a:t>Page number </a:t>
-            </a:r>
-            <a:fld id="{8363412E-7DC2-7642-80E9-9CADEAF62AFD}" type="slidenum">
-              <a:rPr lang="en-US" smtClean="0"/>
-              <a:t>‹#›</a:t>
-            </a:fld>
-            <a:endParaRPr lang="en-US" dirty="0"/>
-          </a:p>
-        </p:txBody>
-      </p:sp>
-      <p:sp>
-        <p:nvSpPr>
           <p:cNvPr id="13" name="Comment">
             <a:extLst>
               <a:ext uri="{FF2B5EF4-FFF2-40B4-BE49-F238E27FC236}">
@@ -475,7 +367,7 @@
         <p:spPr>
           <a:xfrm>
             <a:off x="433386" y="5991451"/>
-            <a:ext cx="11318420" cy="285030"/>
+            <a:ext cx="11318420" cy="571274"/>
           </a:xfrm>
         </p:spPr>
         <p:txBody>
@@ -937,114 +829,6 @@
       </p:grpSpPr>
       <p:sp>
         <p:nvSpPr>
-          <p:cNvPr id="7" name="Date">
-            <a:extLst>
-              <a:ext uri="{FF2B5EF4-FFF2-40B4-BE49-F238E27FC236}">
-                <a16:creationId xmlns:a16="http://schemas.microsoft.com/office/drawing/2014/main" id="{4699C61C-DAD4-EB25-B46F-4C5ECABF3E12}"/>
-              </a:ext>
-            </a:extLst>
-          </p:cNvPr>
-          <p:cNvSpPr>
-            <a:spLocks noGrp="1"/>
-          </p:cNvSpPr>
-          <p:nvPr>
-            <p:ph type="dt" sz="half" idx="10"/>
-          </p:nvPr>
-        </p:nvSpPr>
-        <p:spPr>
-          <a:xfrm>
-            <a:off x="433841" y="6356350"/>
-            <a:ext cx="2743200" cy="365125"/>
-          </a:xfrm>
-        </p:spPr>
-        <p:txBody>
-          <a:bodyPr/>
-          <a:lstStyle/>
-          <a:p>
-            <a:fld id="{11AF75C9-0359-FC42-A307-982A28152EDC}" type="datetimeFigureOut">
-              <a:rPr lang="en-US" smtClean="0"/>
-              <a:t>1/20/25</a:t>
-            </a:fld>
-            <a:r>
-              <a:rPr lang="en-US" dirty="0"/>
-              <a:t> Date</a:t>
-            </a:r>
-          </a:p>
-        </p:txBody>
-      </p:sp>
-      <p:sp>
-        <p:nvSpPr>
-          <p:cNvPr id="8" name="Footer">
-            <a:extLst>
-              <a:ext uri="{FF2B5EF4-FFF2-40B4-BE49-F238E27FC236}">
-                <a16:creationId xmlns:a16="http://schemas.microsoft.com/office/drawing/2014/main" id="{5C522347-795B-EA39-5821-85C30E2C5CB9}"/>
-              </a:ext>
-            </a:extLst>
-          </p:cNvPr>
-          <p:cNvSpPr>
-            <a:spLocks noGrp="1"/>
-          </p:cNvSpPr>
-          <p:nvPr>
-            <p:ph type="ftr" sz="quarter" idx="11"/>
-          </p:nvPr>
-        </p:nvSpPr>
-        <p:spPr>
-          <a:xfrm>
-            <a:off x="4038600" y="6356350"/>
-            <a:ext cx="4114800" cy="365125"/>
-          </a:xfrm>
-        </p:spPr>
-        <p:txBody>
-          <a:bodyPr/>
-          <a:lstStyle/>
-          <a:p>
-            <a:r>
-              <a:rPr lang="en-US" dirty="0"/>
-              <a:t>Footer</a:t>
-            </a:r>
-          </a:p>
-        </p:txBody>
-      </p:sp>
-      <p:sp>
-        <p:nvSpPr>
-          <p:cNvPr id="9" name="Slide Number">
-            <a:extLst>
-              <a:ext uri="{FF2B5EF4-FFF2-40B4-BE49-F238E27FC236}">
-                <a16:creationId xmlns:a16="http://schemas.microsoft.com/office/drawing/2014/main" id="{74690D4D-FBDD-B39E-6FF7-2269EB931D01}"/>
-              </a:ext>
-            </a:extLst>
-          </p:cNvPr>
-          <p:cNvSpPr>
-            <a:spLocks noGrp="1"/>
-          </p:cNvSpPr>
-          <p:nvPr>
-            <p:ph type="sldNum" sz="quarter" idx="12"/>
-          </p:nvPr>
-        </p:nvSpPr>
-        <p:spPr>
-          <a:xfrm>
-            <a:off x="9009061" y="6356349"/>
-            <a:ext cx="2743200" cy="365125"/>
-          </a:xfrm>
-        </p:spPr>
-        <p:txBody>
-          <a:bodyPr/>
-          <a:lstStyle/>
-          <a:p>
-            <a:r>
-              <a:rPr lang="en-US" dirty="0"/>
-              <a:t>Page number </a:t>
-            </a:r>
-            <a:fld id="{8363412E-7DC2-7642-80E9-9CADEAF62AFD}" type="slidenum">
-              <a:rPr lang="en-US" smtClean="0"/>
-              <a:t>‹#›</a:t>
-            </a:fld>
-            <a:endParaRPr lang="en-US" dirty="0"/>
-          </a:p>
-        </p:txBody>
-      </p:sp>
-      <p:sp>
-        <p:nvSpPr>
           <p:cNvPr id="26" name="SummaryTable">
             <a:extLst>
               <a:ext uri="{FF2B5EF4-FFF2-40B4-BE49-F238E27FC236}">
@@ -1446,109 +1230,34 @@
       </p:sp>
       <p:sp>
         <p:nvSpPr>
-          <p:cNvPr id="5" name="Date">
-            <a:extLst>
-              <a:ext uri="{FF2B5EF4-FFF2-40B4-BE49-F238E27FC236}">
-                <a16:creationId xmlns:a16="http://schemas.microsoft.com/office/drawing/2014/main" id="{F1AC5C03-7145-749C-3714-94FDDE2B3DBE}"/>
-              </a:ext>
-            </a:extLst>
-          </p:cNvPr>
-          <p:cNvSpPr>
-            <a:spLocks noGrp="1"/>
-          </p:cNvSpPr>
-          <p:nvPr>
-            <p:ph type="dt" sz="half" idx="10"/>
-          </p:nvPr>
-        </p:nvSpPr>
-        <p:spPr>
-          <a:xfrm>
-            <a:off x="433841" y="6356350"/>
-            <a:ext cx="2743200" cy="365125"/>
+          <p:cNvPr id="7" name="Slide Number">
+            <a:extLst>
+              <a:ext uri="{FF2B5EF4-FFF2-40B4-BE49-F238E27FC236}">
+                <a16:creationId xmlns:a16="http://schemas.microsoft.com/office/drawing/2014/main" id="{7150877C-78C3-C5D8-8B5F-50EFDA644FA4}"/>
+              </a:ext>
+            </a:extLst>
+          </p:cNvPr>
+          <p:cNvSpPr>
+            <a:spLocks noGrp="1"/>
+          </p:cNvSpPr>
+          <p:nvPr>
+            <p:ph type="sldNum" sz="quarter" idx="12"/>
+          </p:nvPr>
+        </p:nvSpPr>
+        <p:spPr>
+          <a:xfrm>
+            <a:off x="10532961" y="6356349"/>
+            <a:ext cx="1219299" cy="365125"/>
           </a:xfrm>
         </p:spPr>
         <p:txBody>
           <a:bodyPr/>
           <a:lstStyle/>
           <a:p>
-            <a:fld id="{11AF75C9-0359-FC42-A307-982A28152EDC}" type="datetimeFigureOut">
-              <a:rPr lang="en-US" smtClean="0"/>
-              <a:t>1/20/25</a:t>
-            </a:fld>
             <a:r>
               <a:rPr lang="en-US" dirty="0"/>
-              <a:t> Date</a:t>
+              <a:t>Slide number</a:t>
             </a:r>
-          </a:p>
-        </p:txBody>
-      </p:sp>
-      <p:sp>
-        <p:nvSpPr>
-          <p:cNvPr id="6" name="Footer">
-            <a:extLst>
-              <a:ext uri="{FF2B5EF4-FFF2-40B4-BE49-F238E27FC236}">
-                <a16:creationId xmlns:a16="http://schemas.microsoft.com/office/drawing/2014/main" id="{07010833-7923-391A-C10E-06A52DD0A82E}"/>
-              </a:ext>
-            </a:extLst>
-          </p:cNvPr>
-          <p:cNvSpPr>
-            <a:spLocks noGrp="1"/>
-          </p:cNvSpPr>
-          <p:nvPr>
-            <p:ph type="ftr" sz="quarter" idx="11"/>
-          </p:nvPr>
-        </p:nvSpPr>
-        <p:spPr>
-          <a:xfrm>
-            <a:off x="4038600" y="6356350"/>
-            <a:ext cx="4114800" cy="365125"/>
-          </a:xfrm>
-        </p:spPr>
-        <p:txBody>
-          <a:bodyPr/>
-          <a:lstStyle/>
-          <a:p>
-            <a:r>
-              <a:rPr lang="en-US" dirty="0"/>
-              <a:t>Footer</a:t>
-            </a:r>
-          </a:p>
-        </p:txBody>
-      </p:sp>
-      <p:sp>
-        <p:nvSpPr>
-          <p:cNvPr id="7" name="Slide Number">
-            <a:extLst>
-              <a:ext uri="{FF2B5EF4-FFF2-40B4-BE49-F238E27FC236}">
-                <a16:creationId xmlns:a16="http://schemas.microsoft.com/office/drawing/2014/main" id="{7150877C-78C3-C5D8-8B5F-50EFDA644FA4}"/>
-              </a:ext>
-            </a:extLst>
-          </p:cNvPr>
-          <p:cNvSpPr>
-            <a:spLocks noGrp="1"/>
-          </p:cNvSpPr>
-          <p:nvPr>
-            <p:ph type="sldNum" sz="quarter" idx="12"/>
-          </p:nvPr>
-        </p:nvSpPr>
-        <p:spPr>
-          <a:xfrm>
-            <a:off x="9009061" y="6356349"/>
-            <a:ext cx="2743200" cy="365125"/>
-          </a:xfrm>
-        </p:spPr>
-        <p:txBody>
-          <a:bodyPr/>
-          <a:lstStyle/>
-          <a:p>
-            <a:r>
-              <a:rPr lang="en-US" dirty="0"/>
-              <a:t>Page number </a:t>
-            </a:r>
-            <a:fld id="{8363412E-7DC2-7642-80E9-9CADEAF62AFD}" type="slidenum">
-              <a:rPr lang="en-US" smtClean="0"/>
-              <a:t>‹#›</a:t>
-            </a:fld>
-            <a:endParaRPr lang="en-US" dirty="0"/>
           </a:p>
         </p:txBody>
       </p:sp>

</xml_diff>